<commit_message>
Added refreshed mac benchmarks
</commit_message>
<xml_diff>
--- a/docs/concept.pptx
+++ b/docs/concept.pptx
@@ -9,6 +9,7 @@
     <p:sldId id="256" r:id="rId3"/>
     <p:sldId id="259" r:id="rId4"/>
     <p:sldId id="258" r:id="rId5"/>
+    <p:sldId id="260" r:id="rId6"/>
   </p:sldIdLst>
   <p:sldSz cx="12192000" cy="6858000"/>
   <p:notesSz cx="6858000" cy="9144000"/>
@@ -122,6 +123,11 @@
             <p14:sldId id="258"/>
           </p14:sldIdLst>
         </p14:section>
+        <p14:section name="Results" id="{E0B0A9D0-6673-C347-9DD6-F92382976034}">
+          <p14:sldIdLst>
+            <p14:sldId id="260"/>
+          </p14:sldIdLst>
+        </p14:section>
       </p14:sectionLst>
     </p:ext>
     <p:ext uri="{EFAFB233-063F-42B5-8137-9DF3F51BA10A}">
@@ -278,7 +284,7 @@
           <a:p>
             <a:fld id="{02A3E006-4292-B84D-875F-9D4B73236D7F}" type="datetimeFigureOut">
               <a:rPr lang="en-US" smtClean="0"/>
-              <a:t>8/26/21</a:t>
+              <a:t>9/19/21</a:t>
             </a:fld>
             <a:endParaRPr lang="en-US"/>
           </a:p>
@@ -476,7 +482,7 @@
           <a:p>
             <a:fld id="{02A3E006-4292-B84D-875F-9D4B73236D7F}" type="datetimeFigureOut">
               <a:rPr lang="en-US" smtClean="0"/>
-              <a:t>8/26/21</a:t>
+              <a:t>9/19/21</a:t>
             </a:fld>
             <a:endParaRPr lang="en-US"/>
           </a:p>
@@ -684,7 +690,7 @@
           <a:p>
             <a:fld id="{02A3E006-4292-B84D-875F-9D4B73236D7F}" type="datetimeFigureOut">
               <a:rPr lang="en-US" smtClean="0"/>
-              <a:t>8/26/21</a:t>
+              <a:t>9/19/21</a:t>
             </a:fld>
             <a:endParaRPr lang="en-US"/>
           </a:p>
@@ -882,7 +888,7 @@
           <a:p>
             <a:fld id="{02A3E006-4292-B84D-875F-9D4B73236D7F}" type="datetimeFigureOut">
               <a:rPr lang="en-US" smtClean="0"/>
-              <a:t>8/26/21</a:t>
+              <a:t>9/19/21</a:t>
             </a:fld>
             <a:endParaRPr lang="en-US"/>
           </a:p>
@@ -1157,7 +1163,7 @@
           <a:p>
             <a:fld id="{02A3E006-4292-B84D-875F-9D4B73236D7F}" type="datetimeFigureOut">
               <a:rPr lang="en-US" smtClean="0"/>
-              <a:t>8/26/21</a:t>
+              <a:t>9/19/21</a:t>
             </a:fld>
             <a:endParaRPr lang="en-US"/>
           </a:p>
@@ -1422,7 +1428,7 @@
           <a:p>
             <a:fld id="{02A3E006-4292-B84D-875F-9D4B73236D7F}" type="datetimeFigureOut">
               <a:rPr lang="en-US" smtClean="0"/>
-              <a:t>8/26/21</a:t>
+              <a:t>9/19/21</a:t>
             </a:fld>
             <a:endParaRPr lang="en-US"/>
           </a:p>
@@ -1834,7 +1840,7 @@
           <a:p>
             <a:fld id="{02A3E006-4292-B84D-875F-9D4B73236D7F}" type="datetimeFigureOut">
               <a:rPr lang="en-US" smtClean="0"/>
-              <a:t>8/26/21</a:t>
+              <a:t>9/19/21</a:t>
             </a:fld>
             <a:endParaRPr lang="en-US"/>
           </a:p>
@@ -1975,7 +1981,7 @@
           <a:p>
             <a:fld id="{02A3E006-4292-B84D-875F-9D4B73236D7F}" type="datetimeFigureOut">
               <a:rPr lang="en-US" smtClean="0"/>
-              <a:t>8/26/21</a:t>
+              <a:t>9/19/21</a:t>
             </a:fld>
             <a:endParaRPr lang="en-US"/>
           </a:p>
@@ -2088,7 +2094,7 @@
           <a:p>
             <a:fld id="{02A3E006-4292-B84D-875F-9D4B73236D7F}" type="datetimeFigureOut">
               <a:rPr lang="en-US" smtClean="0"/>
-              <a:t>8/26/21</a:t>
+              <a:t>9/19/21</a:t>
             </a:fld>
             <a:endParaRPr lang="en-US"/>
           </a:p>
@@ -2399,7 +2405,7 @@
           <a:p>
             <a:fld id="{02A3E006-4292-B84D-875F-9D4B73236D7F}" type="datetimeFigureOut">
               <a:rPr lang="en-US" smtClean="0"/>
-              <a:t>8/26/21</a:t>
+              <a:t>9/19/21</a:t>
             </a:fld>
             <a:endParaRPr lang="en-US"/>
           </a:p>
@@ -2687,7 +2693,7 @@
           <a:p>
             <a:fld id="{02A3E006-4292-B84D-875F-9D4B73236D7F}" type="datetimeFigureOut">
               <a:rPr lang="en-US" smtClean="0"/>
-              <a:t>8/26/21</a:t>
+              <a:t>9/19/21</a:t>
             </a:fld>
             <a:endParaRPr lang="en-US"/>
           </a:p>
@@ -2928,7 +2934,7 @@
           <a:p>
             <a:fld id="{02A3E006-4292-B84D-875F-9D4B73236D7F}" type="datetimeFigureOut">
               <a:rPr lang="en-US" smtClean="0"/>
-              <a:t>8/26/21</a:t>
+              <a:t>9/19/21</a:t>
             </a:fld>
             <a:endParaRPr lang="en-US"/>
           </a:p>
@@ -8269,6 +8275,220 @@
 </p:sld>
 </file>
 
+<file path=ppt/slides/slide5.xml><?xml version="1.0" encoding="utf-8"?>
+<p:sld xmlns:a="http://schemas.openxmlformats.org/drawingml/2006/main" xmlns:r="http://schemas.openxmlformats.org/officeDocument/2006/relationships" xmlns:p="http://schemas.openxmlformats.org/presentationml/2006/main">
+  <p:cSld>
+    <p:bg>
+      <p:bgPr>
+        <a:solidFill>
+          <a:schemeClr val="bg1"/>
+        </a:solidFill>
+        <a:effectLst/>
+      </p:bgPr>
+    </p:bg>
+    <p:spTree>
+      <p:nvGrpSpPr>
+        <p:cNvPr id="1" name=""/>
+        <p:cNvGrpSpPr/>
+        <p:nvPr/>
+      </p:nvGrpSpPr>
+      <p:grpSpPr>
+        <a:xfrm>
+          <a:off x="0" y="0"/>
+          <a:ext cx="0" cy="0"/>
+          <a:chOff x="0" y="0"/>
+          <a:chExt cx="0" cy="0"/>
+        </a:xfrm>
+      </p:grpSpPr>
+      <p:sp>
+        <p:nvSpPr>
+          <p:cNvPr id="10" name="Rectangle 9">
+            <a:extLst>
+              <a:ext uri="{FF2B5EF4-FFF2-40B4-BE49-F238E27FC236}">
+                <a16:creationId xmlns:a16="http://schemas.microsoft.com/office/drawing/2014/main" id="{D4D28E87-62D2-4602-B72F-5F74AA236CC3}"/>
+              </a:ext>
+              <a:ext uri="{C183D7F6-B498-43B3-948B-1728B52AA6E4}">
+                <adec:decorative xmlns:adec="http://schemas.microsoft.com/office/drawing/2017/decorative" val="1"/>
+              </a:ext>
+            </a:extLst>
+          </p:cNvPr>
+          <p:cNvSpPr>
+            <a:spLocks noGrp="1" noRot="1" noChangeAspect="1" noMove="1" noResize="1" noEditPoints="1" noAdjustHandles="1" noChangeArrowheads="1" noChangeShapeType="1" noTextEdit="1"/>
+          </p:cNvSpPr>
+          <p:nvPr>
+            <p:extLst>
+              <p:ext uri="{386F3935-93C4-4BCD-93E2-E3B085C9AB24}">
+                <p16:designElem xmlns:p16="http://schemas.microsoft.com/office/powerpoint/2015/main" val="1"/>
+              </p:ext>
+            </p:extLst>
+          </p:nvPr>
+        </p:nvSpPr>
+        <p:spPr>
+          <a:xfrm>
+            <a:off x="-1" y="0"/>
+            <a:ext cx="12192001" cy="1915064"/>
+          </a:xfrm>
+          <a:prstGeom prst="rect">
+            <a:avLst/>
+          </a:prstGeom>
+          <a:ln>
+            <a:noFill/>
+          </a:ln>
+        </p:spPr>
+        <p:style>
+          <a:lnRef idx="2">
+            <a:schemeClr val="accent1">
+              <a:shade val="50000"/>
+            </a:schemeClr>
+          </a:lnRef>
+          <a:fillRef idx="1">
+            <a:schemeClr val="accent1"/>
+          </a:fillRef>
+          <a:effectRef idx="0">
+            <a:schemeClr val="accent1"/>
+          </a:effectRef>
+          <a:fontRef idx="minor">
+            <a:schemeClr val="lt1"/>
+          </a:fontRef>
+        </p:style>
+        <p:txBody>
+          <a:bodyPr rtlCol="0" anchor="ctr"/>
+          <a:lstStyle/>
+          <a:p>
+            <a:pPr algn="ctr"/>
+            <a:endParaRPr lang="en-US" dirty="0"/>
+          </a:p>
+        </p:txBody>
+      </p:sp>
+      <p:sp>
+        <p:nvSpPr>
+          <p:cNvPr id="2" name="Title 1">
+            <a:extLst>
+              <a:ext uri="{FF2B5EF4-FFF2-40B4-BE49-F238E27FC236}">
+                <a16:creationId xmlns:a16="http://schemas.microsoft.com/office/drawing/2014/main" id="{55A1AE68-4673-D843-A8E8-F84CE63D46DD}"/>
+              </a:ext>
+            </a:extLst>
+          </p:cNvPr>
+          <p:cNvSpPr>
+            <a:spLocks noGrp="1"/>
+          </p:cNvSpPr>
+          <p:nvPr>
+            <p:ph type="title"/>
+          </p:nvPr>
+        </p:nvSpPr>
+        <p:spPr>
+          <a:xfrm>
+            <a:off x="838199" y="291090"/>
+            <a:ext cx="10515599" cy="932688"/>
+          </a:xfrm>
+        </p:spPr>
+        <p:txBody>
+          <a:bodyPr vert="horz" lIns="91440" tIns="45720" rIns="91440" bIns="45720" rtlCol="0" anchor="b">
+            <a:normAutofit/>
+          </a:bodyPr>
+          <a:lstStyle/>
+          <a:p>
+            <a:pPr algn="ctr"/>
+            <a:r>
+              <a:rPr lang="en-US" sz="5400" kern="1200">
+                <a:solidFill>
+                  <a:schemeClr val="bg1"/>
+                </a:solidFill>
+                <a:latin typeface="+mj-lt"/>
+                <a:ea typeface="+mj-ea"/>
+                <a:cs typeface="+mj-cs"/>
+              </a:rPr>
+              <a:t>Results</a:t>
+            </a:r>
+          </a:p>
+        </p:txBody>
+      </p:sp>
+      <p:pic>
+        <p:nvPicPr>
+          <p:cNvPr id="5" name="Picture 4" descr="MacPro2018-6Core-i7-16GB-2.4G">
+            <a:extLst>
+              <a:ext uri="{FF2B5EF4-FFF2-40B4-BE49-F238E27FC236}">
+                <a16:creationId xmlns:a16="http://schemas.microsoft.com/office/drawing/2014/main" id="{73BAFBBA-79E8-244C-9261-F449EE89FC1C}"/>
+              </a:ext>
+            </a:extLst>
+          </p:cNvPr>
+          <p:cNvPicPr>
+            <a:picLocks noChangeAspect="1"/>
+          </p:cNvPicPr>
+          <p:nvPr/>
+        </p:nvPicPr>
+        <p:blipFill>
+          <a:blip r:embed="rId2"/>
+          <a:stretch>
+            <a:fillRect/>
+          </a:stretch>
+        </p:blipFill>
+        <p:spPr>
+          <a:xfrm>
+            <a:off x="838199" y="2306884"/>
+            <a:ext cx="10515599" cy="1393317"/>
+          </a:xfrm>
+          <a:prstGeom prst="rect">
+            <a:avLst/>
+          </a:prstGeom>
+        </p:spPr>
+      </p:pic>
+      <p:sp>
+        <p:nvSpPr>
+          <p:cNvPr id="6" name="TextBox 5">
+            <a:extLst>
+              <a:ext uri="{FF2B5EF4-FFF2-40B4-BE49-F238E27FC236}">
+                <a16:creationId xmlns:a16="http://schemas.microsoft.com/office/drawing/2014/main" id="{09FCA694-AA44-F342-A559-27760FFDDA25}"/>
+              </a:ext>
+            </a:extLst>
+          </p:cNvPr>
+          <p:cNvSpPr txBox="1"/>
+          <p:nvPr/>
+        </p:nvSpPr>
+        <p:spPr>
+          <a:xfrm>
+            <a:off x="3443308" y="1937552"/>
+            <a:ext cx="5720733" cy="369332"/>
+          </a:xfrm>
+          <a:prstGeom prst="rect">
+            <a:avLst/>
+          </a:prstGeom>
+          <a:noFill/>
+        </p:spPr>
+        <p:txBody>
+          <a:bodyPr wrap="none" rtlCol="0">
+            <a:spAutoFit/>
+          </a:bodyPr>
+          <a:lstStyle/>
+          <a:p>
+            <a:r>
+              <a:rPr lang="en-US" dirty="0"/>
+              <a:t>MacPro2018-6Core-i7-16GB-2.4G @2000x39=</a:t>
+            </a:r>
+            <a:r>
+              <a:rPr lang="en-US" dirty="0">
+                <a:solidFill>
+                  <a:srgbClr val="FF0000"/>
+                </a:solidFill>
+              </a:rPr>
+              <a:t>78K Tags/Sec</a:t>
+            </a:r>
+          </a:p>
+        </p:txBody>
+      </p:sp>
+    </p:spTree>
+    <p:extLst>
+      <p:ext uri="{BB962C8B-B14F-4D97-AF65-F5344CB8AC3E}">
+        <p14:creationId xmlns:p14="http://schemas.microsoft.com/office/powerpoint/2010/main" val="1016830542"/>
+      </p:ext>
+    </p:extLst>
+  </p:cSld>
+  <p:clrMapOvr>
+    <a:masterClrMapping/>
+  </p:clrMapOvr>
+</p:sld>
+</file>
+
 <file path=ppt/theme/theme1.xml><?xml version="1.0" encoding="utf-8"?>
 <a:theme xmlns:a="http://schemas.openxmlformats.org/drawingml/2006/main" name="Office Theme">
   <a:themeElements>

</xml_diff>